<commit_message>
DevOps Peru - slides actualizados
</commit_message>
<xml_diff>
--- a/demos/guestbook/Kubernetes Demo.pptx
+++ b/demos/guestbook/Kubernetes Demo.pptx
@@ -535,6 +535,18 @@
             </a:r>
             <a:endParaRPr lang="en-US" dirty="0"/>
           </a:p>
+          <a:p>
+            <a:endParaRPr lang="en-US" dirty="0"/>
+          </a:p>
+          <a:p>
+            <a:r>
+              <a:rPr lang="en-US" dirty="0">
+                <a:hlinkClick r:id="rId4"/>
+              </a:rPr>
+              <a:t>https://github.com/kubernetes/examples/tree/master/guestbook</a:t>
+            </a:r>
+            <a:endParaRPr lang="en-US" dirty="0"/>
+          </a:p>
         </p:txBody>
       </p:sp>
       <p:sp>
@@ -564,6 +576,311 @@
     <p:extLst>
       <p:ext uri="{BB962C8B-B14F-4D97-AF65-F5344CB8AC3E}">
         <p14:creationId xmlns:p14="http://schemas.microsoft.com/office/powerpoint/2010/main" val="558406282"/>
+      </p:ext>
+    </p:extLst>
+  </p:cSld>
+  <p:clrMapOvr>
+    <a:masterClrMapping/>
+  </p:clrMapOvr>
+</p:notes>
+</file>
+
+<file path=ppt/notesSlides/notesSlide2.xml><?xml version="1.0" encoding="utf-8"?>
+<p:notes xmlns:a="http://schemas.openxmlformats.org/drawingml/2006/main" xmlns:r="http://schemas.openxmlformats.org/officeDocument/2006/relationships" xmlns:p="http://schemas.openxmlformats.org/presentationml/2006/main">
+  <p:cSld>
+    <p:spTree>
+      <p:nvGrpSpPr>
+        <p:cNvPr id="1" name=""/>
+        <p:cNvGrpSpPr/>
+        <p:nvPr/>
+      </p:nvGrpSpPr>
+      <p:grpSpPr>
+        <a:xfrm>
+          <a:off x="0" y="0"/>
+          <a:ext cx="0" cy="0"/>
+          <a:chOff x="0" y="0"/>
+          <a:chExt cx="0" cy="0"/>
+        </a:xfrm>
+      </p:grpSpPr>
+      <p:sp>
+        <p:nvSpPr>
+          <p:cNvPr id="2" name="Slide Image Placeholder 1"/>
+          <p:cNvSpPr>
+            <a:spLocks noGrp="1" noRot="1" noChangeAspect="1"/>
+          </p:cNvSpPr>
+          <p:nvPr>
+            <p:ph type="sldImg"/>
+          </p:nvPr>
+        </p:nvSpPr>
+        <p:spPr/>
+      </p:sp>
+      <p:sp>
+        <p:nvSpPr>
+          <p:cNvPr id="3" name="Notes Placeholder 2"/>
+          <p:cNvSpPr>
+            <a:spLocks noGrp="1"/>
+          </p:cNvSpPr>
+          <p:nvPr>
+            <p:ph type="body" idx="1"/>
+          </p:nvPr>
+        </p:nvSpPr>
+        <p:spPr/>
+        <p:txBody>
+          <a:bodyPr/>
+          <a:lstStyle/>
+          <a:p>
+            <a:pPr marL="0" marR="0" lvl="0" indent="0" algn="l" defTabSz="457200" rtl="0" eaLnBrk="1" fontAlgn="auto" latinLnBrk="0" hangingPunct="1">
+              <a:lnSpc>
+                <a:spcPct val="100000"/>
+              </a:lnSpc>
+              <a:spcBef>
+                <a:spcPts val="0"/>
+              </a:spcBef>
+              <a:spcAft>
+                <a:spcPts val="0"/>
+              </a:spcAft>
+              <a:buClrTx/>
+              <a:buSzTx/>
+              <a:buFontTx/>
+              <a:buNone/>
+              <a:tabLst/>
+              <a:defRPr/>
+            </a:pPr>
+            <a:r>
+              <a:rPr lang="en-US" sz="1200" kern="1200" dirty="0">
+                <a:solidFill>
+                  <a:schemeClr val="tx1"/>
+                </a:solidFill>
+                <a:effectLst/>
+                <a:latin typeface="+mn-lt"/>
+                <a:ea typeface="+mn-ea"/>
+                <a:cs typeface="+mn-cs"/>
+                <a:hlinkClick r:id="rId3"/>
+              </a:rPr>
+              <a:t>http://blog.arungupta.me/kubernetes-namespaces-qos-cluster/</a:t>
+            </a:r>
+            <a:endParaRPr lang="en-US" sz="1200" kern="1200" dirty="0">
+              <a:solidFill>
+                <a:schemeClr val="tx1"/>
+              </a:solidFill>
+              <a:effectLst/>
+              <a:latin typeface="+mn-lt"/>
+              <a:ea typeface="+mn-ea"/>
+              <a:cs typeface="+mn-cs"/>
+            </a:endParaRPr>
+          </a:p>
+          <a:p>
+            <a:endParaRPr lang="en-US" dirty="0"/>
+          </a:p>
+        </p:txBody>
+      </p:sp>
+      <p:sp>
+        <p:nvSpPr>
+          <p:cNvPr id="4" name="Slide Number Placeholder 3"/>
+          <p:cNvSpPr>
+            <a:spLocks noGrp="1"/>
+          </p:cNvSpPr>
+          <p:nvPr>
+            <p:ph type="sldNum" sz="quarter" idx="5"/>
+          </p:nvPr>
+        </p:nvSpPr>
+        <p:spPr/>
+        <p:txBody>
+          <a:bodyPr/>
+          <a:lstStyle/>
+          <a:p>
+            <a:fld id="{78C3A030-F2FB-F243-8174-E9FC6DBDC2F9}" type="slidenum">
+              <a:rPr lang="es-ES" smtClean="0"/>
+              <a:t>3</a:t>
+            </a:fld>
+            <a:endParaRPr lang="es-ES"/>
+          </a:p>
+        </p:txBody>
+      </p:sp>
+    </p:spTree>
+    <p:extLst>
+      <p:ext uri="{BB962C8B-B14F-4D97-AF65-F5344CB8AC3E}">
+        <p14:creationId xmlns:p14="http://schemas.microsoft.com/office/powerpoint/2010/main" val="839693979"/>
+      </p:ext>
+    </p:extLst>
+  </p:cSld>
+  <p:clrMapOvr>
+    <a:masterClrMapping/>
+  </p:clrMapOvr>
+</p:notes>
+</file>
+
+<file path=ppt/notesSlides/notesSlide3.xml><?xml version="1.0" encoding="utf-8"?>
+<p:notes xmlns:a="http://schemas.openxmlformats.org/drawingml/2006/main" xmlns:r="http://schemas.openxmlformats.org/officeDocument/2006/relationships" xmlns:p="http://schemas.openxmlformats.org/presentationml/2006/main">
+  <p:cSld>
+    <p:spTree>
+      <p:nvGrpSpPr>
+        <p:cNvPr id="1" name=""/>
+        <p:cNvGrpSpPr/>
+        <p:nvPr/>
+      </p:nvGrpSpPr>
+      <p:grpSpPr>
+        <a:xfrm>
+          <a:off x="0" y="0"/>
+          <a:ext cx="0" cy="0"/>
+          <a:chOff x="0" y="0"/>
+          <a:chExt cx="0" cy="0"/>
+        </a:xfrm>
+      </p:grpSpPr>
+      <p:sp>
+        <p:nvSpPr>
+          <p:cNvPr id="2" name="Slide Image Placeholder 1"/>
+          <p:cNvSpPr>
+            <a:spLocks noGrp="1" noRot="1" noChangeAspect="1"/>
+          </p:cNvSpPr>
+          <p:nvPr>
+            <p:ph type="sldImg"/>
+          </p:nvPr>
+        </p:nvSpPr>
+        <p:spPr/>
+      </p:sp>
+      <p:sp>
+        <p:nvSpPr>
+          <p:cNvPr id="3" name="Notes Placeholder 2"/>
+          <p:cNvSpPr>
+            <a:spLocks noGrp="1"/>
+          </p:cNvSpPr>
+          <p:nvPr>
+            <p:ph type="body" idx="1"/>
+          </p:nvPr>
+        </p:nvSpPr>
+        <p:spPr/>
+        <p:txBody>
+          <a:bodyPr/>
+          <a:lstStyle/>
+          <a:p>
+            <a:r>
+              <a:rPr lang="en-US" dirty="0">
+                <a:hlinkClick r:id="rId3"/>
+              </a:rPr>
+              <a:t>https://levelup.gitconnected.com/kubernetes-autoscaling-101-cluster-autoscaler-horizontal-pod-autoscaler-and-vertical-pod-2a441d9ad231</a:t>
+            </a:r>
+            <a:endParaRPr lang="en-US" dirty="0"/>
+          </a:p>
+        </p:txBody>
+      </p:sp>
+      <p:sp>
+        <p:nvSpPr>
+          <p:cNvPr id="4" name="Slide Number Placeholder 3"/>
+          <p:cNvSpPr>
+            <a:spLocks noGrp="1"/>
+          </p:cNvSpPr>
+          <p:nvPr>
+            <p:ph type="sldNum" sz="quarter" idx="5"/>
+          </p:nvPr>
+        </p:nvSpPr>
+        <p:spPr/>
+        <p:txBody>
+          <a:bodyPr/>
+          <a:lstStyle/>
+          <a:p>
+            <a:fld id="{78C3A030-F2FB-F243-8174-E9FC6DBDC2F9}" type="slidenum">
+              <a:rPr lang="es-ES" smtClean="0"/>
+              <a:t>4</a:t>
+            </a:fld>
+            <a:endParaRPr lang="es-ES"/>
+          </a:p>
+        </p:txBody>
+      </p:sp>
+    </p:spTree>
+    <p:extLst>
+      <p:ext uri="{BB962C8B-B14F-4D97-AF65-F5344CB8AC3E}">
+        <p14:creationId xmlns:p14="http://schemas.microsoft.com/office/powerpoint/2010/main" val="3353856790"/>
+      </p:ext>
+    </p:extLst>
+  </p:cSld>
+  <p:clrMapOvr>
+    <a:masterClrMapping/>
+  </p:clrMapOvr>
+</p:notes>
+</file>
+
+<file path=ppt/notesSlides/notesSlide4.xml><?xml version="1.0" encoding="utf-8"?>
+<p:notes xmlns:a="http://schemas.openxmlformats.org/drawingml/2006/main" xmlns:r="http://schemas.openxmlformats.org/officeDocument/2006/relationships" xmlns:p="http://schemas.openxmlformats.org/presentationml/2006/main">
+  <p:cSld>
+    <p:spTree>
+      <p:nvGrpSpPr>
+        <p:cNvPr id="1" name=""/>
+        <p:cNvGrpSpPr/>
+        <p:nvPr/>
+      </p:nvGrpSpPr>
+      <p:grpSpPr>
+        <a:xfrm>
+          <a:off x="0" y="0"/>
+          <a:ext cx="0" cy="0"/>
+          <a:chOff x="0" y="0"/>
+          <a:chExt cx="0" cy="0"/>
+        </a:xfrm>
+      </p:grpSpPr>
+      <p:sp>
+        <p:nvSpPr>
+          <p:cNvPr id="2" name="Slide Image Placeholder 1"/>
+          <p:cNvSpPr>
+            <a:spLocks noGrp="1" noRot="1" noChangeAspect="1"/>
+          </p:cNvSpPr>
+          <p:nvPr>
+            <p:ph type="sldImg"/>
+          </p:nvPr>
+        </p:nvSpPr>
+        <p:spPr/>
+      </p:sp>
+      <p:sp>
+        <p:nvSpPr>
+          <p:cNvPr id="3" name="Notes Placeholder 2"/>
+          <p:cNvSpPr>
+            <a:spLocks noGrp="1"/>
+          </p:cNvSpPr>
+          <p:nvPr>
+            <p:ph type="body" idx="1"/>
+          </p:nvPr>
+        </p:nvSpPr>
+        <p:spPr/>
+        <p:txBody>
+          <a:bodyPr/>
+          <a:lstStyle/>
+          <a:p>
+            <a:r>
+              <a:rPr lang="en-US" dirty="0">
+                <a:hlinkClick r:id="rId3"/>
+              </a:rPr>
+              <a:t>https://medium.com/google-cloud/kubernetes-nodeport-vs-loadbalancer-vs-ingress-when-should-i-use-what-922f010849e0</a:t>
+            </a:r>
+            <a:endParaRPr lang="en-US" dirty="0"/>
+          </a:p>
+        </p:txBody>
+      </p:sp>
+      <p:sp>
+        <p:nvSpPr>
+          <p:cNvPr id="4" name="Slide Number Placeholder 3"/>
+          <p:cNvSpPr>
+            <a:spLocks noGrp="1"/>
+          </p:cNvSpPr>
+          <p:nvPr>
+            <p:ph type="sldNum" sz="quarter" idx="5"/>
+          </p:nvPr>
+        </p:nvSpPr>
+        <p:spPr/>
+        <p:txBody>
+          <a:bodyPr/>
+          <a:lstStyle/>
+          <a:p>
+            <a:fld id="{78C3A030-F2FB-F243-8174-E9FC6DBDC2F9}" type="slidenum">
+              <a:rPr lang="es-ES" smtClean="0"/>
+              <a:t>5</a:t>
+            </a:fld>
+            <a:endParaRPr lang="es-ES"/>
+          </a:p>
+        </p:txBody>
+      </p:sp>
+    </p:spTree>
+    <p:extLst>
+      <p:ext uri="{BB962C8B-B14F-4D97-AF65-F5344CB8AC3E}">
+        <p14:creationId xmlns:p14="http://schemas.microsoft.com/office/powerpoint/2010/main" val="1980163121"/>
       </p:ext>
     </p:extLst>
   </p:cSld>

</xml_diff>